<commit_message>
working on data preprocessing
</commit_message>
<xml_diff>
--- a/01 - DataPreprocessing/slides.pptx
+++ b/01 - DataPreprocessing/slides.pptx
@@ -5,10 +5,10 @@
     <p:sldMasterId id="2147483648" r:id="rId1"/>
   </p:sldMasterIdLst>
   <p:notesMasterIdLst>
-    <p:notesMasterId r:id="rId29"/>
+    <p:notesMasterId r:id="rId33"/>
   </p:notesMasterIdLst>
   <p:handoutMasterIdLst>
-    <p:handoutMasterId r:id="rId30"/>
+    <p:handoutMasterId r:id="rId34"/>
   </p:handoutMasterIdLst>
   <p:sldIdLst>
     <p:sldId id="479" r:id="rId2"/>
@@ -38,6 +38,10 @@
     <p:sldId id="505" r:id="rId26"/>
     <p:sldId id="506" r:id="rId27"/>
     <p:sldId id="325" r:id="rId28"/>
+    <p:sldId id="509" r:id="rId29"/>
+    <p:sldId id="507" r:id="rId30"/>
+    <p:sldId id="510" r:id="rId31"/>
+    <p:sldId id="508" r:id="rId32"/>
   </p:sldIdLst>
   <p:sldSz cx="12192000" cy="6858000"/>
   <p:notesSz cx="6858000" cy="9144000"/>
@@ -4606,7 +4610,11 @@
           <a:p>
             <a:r>
               <a:rPr lang="it-IT" dirty="0"/>
-              <a:t>Python</a:t>
+              <a:t>Python &amp; </a:t>
+            </a:r>
+            <a:r>
+              <a:rPr lang="it-IT" dirty="0" err="1"/>
+              <a:t>Pandas</a:t>
             </a:r>
             <a:endParaRPr lang="en-US" dirty="0"/>
           </a:p>
@@ -11019,6 +11027,521 @@
 </p:sld>
 </file>
 
+<file path=ppt/slides/slide28.xml><?xml version="1.0" encoding="utf-8"?>
+<p:sld xmlns:a="http://schemas.openxmlformats.org/drawingml/2006/main" xmlns:r="http://schemas.openxmlformats.org/officeDocument/2006/relationships" xmlns:p="http://schemas.openxmlformats.org/presentationml/2006/main">
+  <p:cSld>
+    <p:spTree>
+      <p:nvGrpSpPr>
+        <p:cNvPr id="1" name=""/>
+        <p:cNvGrpSpPr/>
+        <p:nvPr/>
+      </p:nvGrpSpPr>
+      <p:grpSpPr>
+        <a:xfrm>
+          <a:off x="0" y="0"/>
+          <a:ext cx="0" cy="0"/>
+          <a:chOff x="0" y="0"/>
+          <a:chExt cx="0" cy="0"/>
+        </a:xfrm>
+      </p:grpSpPr>
+      <p:sp>
+        <p:nvSpPr>
+          <p:cNvPr id="2" name="Titolo 1">
+            <a:extLst>
+              <a:ext uri="{FF2B5EF4-FFF2-40B4-BE49-F238E27FC236}">
+                <a16:creationId xmlns:a16="http://schemas.microsoft.com/office/drawing/2014/main" id="{F8782B6B-00EF-4599-99C8-8CC6AB27396C}"/>
+              </a:ext>
+            </a:extLst>
+          </p:cNvPr>
+          <p:cNvSpPr>
+            <a:spLocks noGrp="1"/>
+          </p:cNvSpPr>
+          <p:nvPr>
+            <p:ph type="title"/>
+          </p:nvPr>
+        </p:nvSpPr>
+        <p:spPr/>
+        <p:txBody>
+          <a:bodyPr/>
+          <a:lstStyle/>
+          <a:p>
+            <a:r>
+              <a:rPr lang="it-IT" dirty="0"/>
+              <a:t>Data </a:t>
+            </a:r>
+            <a:r>
+              <a:rPr lang="it-IT" dirty="0" err="1"/>
+              <a:t>preprocessing</a:t>
+            </a:r>
+            <a:endParaRPr lang="en-US" dirty="0"/>
+          </a:p>
+        </p:txBody>
+      </p:sp>
+      <p:sp>
+        <p:nvSpPr>
+          <p:cNvPr id="3" name="Segnaposto contenuto 2">
+            <a:extLst>
+              <a:ext uri="{FF2B5EF4-FFF2-40B4-BE49-F238E27FC236}">
+                <a16:creationId xmlns:a16="http://schemas.microsoft.com/office/drawing/2014/main" id="{AAF1EDE9-2DA7-4913-BD0F-DC0D52EDA6DB}"/>
+              </a:ext>
+            </a:extLst>
+          </p:cNvPr>
+          <p:cNvSpPr>
+            <a:spLocks noGrp="1"/>
+          </p:cNvSpPr>
+          <p:nvPr>
+            <p:ph idx="1"/>
+          </p:nvPr>
+        </p:nvSpPr>
+        <p:spPr/>
+        <p:txBody>
+          <a:bodyPr/>
+          <a:lstStyle/>
+          <a:p>
+            <a:r>
+              <a:rPr lang="en-US" dirty="0">
+                <a:effectLst/>
+                <a:latin typeface="Arial" panose="020B0604020202020204" pitchFamily="34" charset="0"/>
+              </a:rPr>
+              <a:t>Data preprocessing plays a key role in a data analytics process [1]</a:t>
+            </a:r>
+          </a:p>
+          <a:p>
+            <a:pPr lvl="1"/>
+            <a:r>
+              <a:rPr lang="en-US" dirty="0">
+                <a:effectLst/>
+                <a:latin typeface="Arial" panose="020B0604020202020204" pitchFamily="34" charset="0"/>
+              </a:rPr>
+              <a:t>It encompasses a broad range of activities that span from correcting errors to selecting the most relevant features for the analysis phase</a:t>
+            </a:r>
+          </a:p>
+          <a:p>
+            <a:pPr lvl="1"/>
+            <a:r>
+              <a:rPr lang="en-US" dirty="0">
+                <a:effectLst/>
+                <a:latin typeface="Arial" panose="020B0604020202020204" pitchFamily="34" charset="0"/>
+              </a:rPr>
+              <a:t>There is no clear evidence, or rules defined, on how pre-processing transformations (</a:t>
+            </a:r>
+            <a:r>
+              <a:rPr lang="en-US" dirty="0" err="1">
+                <a:effectLst/>
+                <a:latin typeface="Arial" panose="020B0604020202020204" pitchFamily="34" charset="0"/>
+              </a:rPr>
+              <a:t>e,g</a:t>
+            </a:r>
+            <a:r>
+              <a:rPr lang="en-US" dirty="0">
+                <a:effectLst/>
+                <a:latin typeface="Arial" panose="020B0604020202020204" pitchFamily="34" charset="0"/>
+              </a:rPr>
+              <a:t>., normalization, discretization, etc.) impact the final results of the analysis</a:t>
+            </a:r>
+          </a:p>
+          <a:p>
+            <a:pPr lvl="1"/>
+            <a:r>
+              <a:rPr lang="en-US" dirty="0">
+                <a:effectLst/>
+                <a:latin typeface="Arial" panose="020B0604020202020204" pitchFamily="34" charset="0"/>
+              </a:rPr>
+              <a:t>The problem is exacerbated when transformations are combined into pre-processing pipeline prototypes</a:t>
+            </a:r>
+          </a:p>
+          <a:p>
+            <a:pPr lvl="1"/>
+            <a:r>
+              <a:rPr lang="en-US" dirty="0">
+                <a:effectLst/>
+                <a:latin typeface="Arial" panose="020B0604020202020204" pitchFamily="34" charset="0"/>
+              </a:rPr>
+              <a:t>Data scientists cannot easily foresee the impact of pipeline prototypes and hence require a method to discriminate between them and find the most relevant ones</a:t>
+            </a:r>
+            <a:endParaRPr lang="en-US" dirty="0"/>
+          </a:p>
+        </p:txBody>
+      </p:sp>
+      <p:sp>
+        <p:nvSpPr>
+          <p:cNvPr id="4" name="Segnaposto piè di pagina 3">
+            <a:extLst>
+              <a:ext uri="{FF2B5EF4-FFF2-40B4-BE49-F238E27FC236}">
+                <a16:creationId xmlns:a16="http://schemas.microsoft.com/office/drawing/2014/main" id="{C5B4CF53-406A-46F8-A37C-76BAF009E986}"/>
+              </a:ext>
+            </a:extLst>
+          </p:cNvPr>
+          <p:cNvSpPr>
+            <a:spLocks noGrp="1"/>
+          </p:cNvSpPr>
+          <p:nvPr>
+            <p:ph type="ftr" sz="quarter" idx="11"/>
+          </p:nvPr>
+        </p:nvSpPr>
+        <p:spPr/>
+        <p:txBody>
+          <a:bodyPr/>
+          <a:lstStyle/>
+          <a:p>
+            <a:pPr algn="l"/>
+            <a:r>
+              <a:rPr lang="it-IT"/>
+              <a:t>Matteo Francia – University of Bologna</a:t>
+            </a:r>
+            <a:endParaRPr lang="it-IT" dirty="0"/>
+          </a:p>
+        </p:txBody>
+      </p:sp>
+      <p:sp>
+        <p:nvSpPr>
+          <p:cNvPr id="5" name="Segnaposto numero diapositiva 4">
+            <a:extLst>
+              <a:ext uri="{FF2B5EF4-FFF2-40B4-BE49-F238E27FC236}">
+                <a16:creationId xmlns:a16="http://schemas.microsoft.com/office/drawing/2014/main" id="{7D3A699E-1518-49ED-99B8-6613A8418D85}"/>
+              </a:ext>
+            </a:extLst>
+          </p:cNvPr>
+          <p:cNvSpPr>
+            <a:spLocks noGrp="1"/>
+          </p:cNvSpPr>
+          <p:nvPr>
+            <p:ph type="sldNum" sz="quarter" idx="12"/>
+          </p:nvPr>
+        </p:nvSpPr>
+        <p:spPr/>
+        <p:txBody>
+          <a:bodyPr/>
+          <a:lstStyle/>
+          <a:p>
+            <a:fld id="{5DD6F1BA-2510-46FC-9346-AB1F3CA1593B}" type="slidenum">
+              <a:rPr lang="it-IT" smtClean="0"/>
+              <a:t>28</a:t>
+            </a:fld>
+            <a:endParaRPr lang="it-IT"/>
+          </a:p>
+        </p:txBody>
+      </p:sp>
+      <p:sp>
+        <p:nvSpPr>
+          <p:cNvPr id="6" name="Segnaposto contenuto 5">
+            <a:extLst>
+              <a:ext uri="{FF2B5EF4-FFF2-40B4-BE49-F238E27FC236}">
+                <a16:creationId xmlns:a16="http://schemas.microsoft.com/office/drawing/2014/main" id="{092C8DDE-D26F-44B7-A79A-B043D9D95A39}"/>
+              </a:ext>
+            </a:extLst>
+          </p:cNvPr>
+          <p:cNvSpPr>
+            <a:spLocks noGrp="1"/>
+          </p:cNvSpPr>
+          <p:nvPr>
+            <p:ph idx="13"/>
+          </p:nvPr>
+        </p:nvSpPr>
+        <p:spPr/>
+        <p:txBody>
+          <a:bodyPr/>
+          <a:lstStyle/>
+          <a:p>
+            <a:r>
+              <a:rPr lang="it-IT" dirty="0"/>
+              <a:t>[1] Joseph Giovanelli, </a:t>
+            </a:r>
+            <a:r>
+              <a:rPr lang="it-IT" dirty="0" err="1"/>
+              <a:t>Besim</a:t>
+            </a:r>
+            <a:r>
+              <a:rPr lang="it-IT" dirty="0"/>
+              <a:t> </a:t>
+            </a:r>
+            <a:r>
+              <a:rPr lang="it-IT" dirty="0" err="1"/>
+              <a:t>Bilalli</a:t>
+            </a:r>
+            <a:r>
+              <a:rPr lang="it-IT" dirty="0"/>
+              <a:t>, Alberto </a:t>
+            </a:r>
+            <a:r>
+              <a:rPr lang="it-IT" dirty="0" err="1"/>
+              <a:t>Abelló</a:t>
+            </a:r>
+            <a:r>
+              <a:rPr lang="it-IT" dirty="0"/>
+              <a:t>: </a:t>
+            </a:r>
+            <a:r>
+              <a:rPr lang="it-IT" dirty="0" err="1"/>
+              <a:t>Effective</a:t>
+            </a:r>
+            <a:r>
+              <a:rPr lang="it-IT" dirty="0"/>
+              <a:t> data </a:t>
+            </a:r>
+            <a:r>
+              <a:rPr lang="it-IT" dirty="0" err="1"/>
+              <a:t>pre</a:t>
+            </a:r>
+            <a:r>
+              <a:rPr lang="it-IT" dirty="0"/>
+              <a:t>-processing for </a:t>
+            </a:r>
+            <a:r>
+              <a:rPr lang="it-IT" dirty="0" err="1"/>
+              <a:t>AutoML</a:t>
+            </a:r>
+            <a:r>
+              <a:rPr lang="it-IT" dirty="0"/>
+              <a:t>. DOLAP 2021: 1-10</a:t>
+            </a:r>
+            <a:endParaRPr lang="en-US" dirty="0"/>
+          </a:p>
+        </p:txBody>
+      </p:sp>
+    </p:spTree>
+    <p:extLst>
+      <p:ext uri="{BB962C8B-B14F-4D97-AF65-F5344CB8AC3E}">
+        <p14:creationId xmlns:p14="http://schemas.microsoft.com/office/powerpoint/2010/main" val="1885678929"/>
+      </p:ext>
+    </p:extLst>
+  </p:cSld>
+  <p:clrMapOvr>
+    <a:masterClrMapping/>
+  </p:clrMapOvr>
+</p:sld>
+</file>
+
+<file path=ppt/slides/slide29.xml><?xml version="1.0" encoding="utf-8"?>
+<p:sld xmlns:a="http://schemas.openxmlformats.org/drawingml/2006/main" xmlns:r="http://schemas.openxmlformats.org/officeDocument/2006/relationships" xmlns:p="http://schemas.openxmlformats.org/presentationml/2006/main">
+  <p:cSld>
+    <p:spTree>
+      <p:nvGrpSpPr>
+        <p:cNvPr id="1" name=""/>
+        <p:cNvGrpSpPr/>
+        <p:nvPr/>
+      </p:nvGrpSpPr>
+      <p:grpSpPr>
+        <a:xfrm>
+          <a:off x="0" y="0"/>
+          <a:ext cx="0" cy="0"/>
+          <a:chOff x="0" y="0"/>
+          <a:chExt cx="0" cy="0"/>
+        </a:xfrm>
+      </p:grpSpPr>
+      <p:sp>
+        <p:nvSpPr>
+          <p:cNvPr id="2" name="Titolo 1">
+            <a:extLst>
+              <a:ext uri="{FF2B5EF4-FFF2-40B4-BE49-F238E27FC236}">
+                <a16:creationId xmlns:a16="http://schemas.microsoft.com/office/drawing/2014/main" id="{A34F21C4-2E8E-4307-AC2E-138DEE20D64B}"/>
+              </a:ext>
+            </a:extLst>
+          </p:cNvPr>
+          <p:cNvSpPr>
+            <a:spLocks noGrp="1"/>
+          </p:cNvSpPr>
+          <p:nvPr>
+            <p:ph type="title"/>
+          </p:nvPr>
+        </p:nvSpPr>
+        <p:spPr/>
+        <p:txBody>
+          <a:bodyPr/>
+          <a:lstStyle/>
+          <a:p>
+            <a:r>
+              <a:rPr lang="it-IT" dirty="0"/>
+              <a:t>Data </a:t>
+            </a:r>
+            <a:r>
+              <a:rPr lang="it-IT" dirty="0" err="1"/>
+              <a:t>preprocessing</a:t>
+            </a:r>
+            <a:endParaRPr lang="en-US" dirty="0"/>
+          </a:p>
+        </p:txBody>
+      </p:sp>
+      <p:sp>
+        <p:nvSpPr>
+          <p:cNvPr id="3" name="Segnaposto contenuto 2">
+            <a:extLst>
+              <a:ext uri="{FF2B5EF4-FFF2-40B4-BE49-F238E27FC236}">
+                <a16:creationId xmlns:a16="http://schemas.microsoft.com/office/drawing/2014/main" id="{799E0969-EC79-4A54-88AA-5E53F431ED1D}"/>
+              </a:ext>
+            </a:extLst>
+          </p:cNvPr>
+          <p:cNvSpPr>
+            <a:spLocks noGrp="1"/>
+          </p:cNvSpPr>
+          <p:nvPr>
+            <p:ph idx="1"/>
+          </p:nvPr>
+        </p:nvSpPr>
+        <p:spPr/>
+        <p:txBody>
+          <a:bodyPr/>
+          <a:lstStyle/>
+          <a:p>
+            <a:r>
+              <a:rPr lang="en-US" dirty="0"/>
+              <a:t>Data preprocessing avoids “Garbage in, garbage out”</a:t>
+            </a:r>
+          </a:p>
+          <a:p>
+            <a:pPr lvl="1"/>
+            <a:r>
+              <a:rPr lang="en-US" dirty="0"/>
+              <a:t>“Garbage in, garbage out” is particularly applicable to data mining and machine learning</a:t>
+            </a:r>
+          </a:p>
+          <a:p>
+            <a:pPr lvl="1"/>
+            <a:r>
+              <a:rPr lang="en-US" dirty="0"/>
+              <a:t>Indeed, data-collection methods are often loosely controlled, resulting in:</a:t>
+            </a:r>
+          </a:p>
+          <a:p>
+            <a:pPr lvl="2"/>
+            <a:r>
+              <a:rPr lang="en-US" dirty="0"/>
+              <a:t>Out-of-range values (e.g., Income: −100)</a:t>
+            </a:r>
+          </a:p>
+          <a:p>
+            <a:pPr lvl="2"/>
+            <a:r>
+              <a:rPr lang="en-US" dirty="0"/>
+              <a:t>Impossible data combinations (e.g., Sex: Male, Pregnant: Yes) </a:t>
+            </a:r>
+          </a:p>
+          <a:p>
+            <a:pPr lvl="2"/>
+            <a:r>
+              <a:rPr lang="en-US" dirty="0"/>
+              <a:t>Missing values</a:t>
+            </a:r>
+          </a:p>
+          <a:p>
+            <a:pPr lvl="2"/>
+            <a:r>
+              <a:rPr lang="en-US" dirty="0"/>
+              <a:t>Inconsistent data among multiple sources</a:t>
+            </a:r>
+          </a:p>
+          <a:p>
+            <a:pPr lvl="2"/>
+            <a:r>
+              <a:rPr lang="en-US" dirty="0"/>
+              <a:t>Etc.</a:t>
+            </a:r>
+          </a:p>
+          <a:p>
+            <a:r>
+              <a:rPr lang="en-US" dirty="0"/>
+              <a:t>Here, we focus on some of these problems</a:t>
+            </a:r>
+          </a:p>
+        </p:txBody>
+      </p:sp>
+      <p:sp>
+        <p:nvSpPr>
+          <p:cNvPr id="4" name="Segnaposto piè di pagina 3">
+            <a:extLst>
+              <a:ext uri="{FF2B5EF4-FFF2-40B4-BE49-F238E27FC236}">
+                <a16:creationId xmlns:a16="http://schemas.microsoft.com/office/drawing/2014/main" id="{F4A25AD8-9BD2-4880-8221-9028920E1FFA}"/>
+              </a:ext>
+            </a:extLst>
+          </p:cNvPr>
+          <p:cNvSpPr>
+            <a:spLocks noGrp="1"/>
+          </p:cNvSpPr>
+          <p:nvPr>
+            <p:ph type="ftr" sz="quarter" idx="11"/>
+          </p:nvPr>
+        </p:nvSpPr>
+        <p:spPr/>
+        <p:txBody>
+          <a:bodyPr/>
+          <a:lstStyle/>
+          <a:p>
+            <a:pPr algn="l"/>
+            <a:r>
+              <a:rPr lang="it-IT"/>
+              <a:t>Matteo Francia – University of Bologna</a:t>
+            </a:r>
+            <a:endParaRPr lang="it-IT" dirty="0"/>
+          </a:p>
+        </p:txBody>
+      </p:sp>
+      <p:sp>
+        <p:nvSpPr>
+          <p:cNvPr id="5" name="Segnaposto numero diapositiva 4">
+            <a:extLst>
+              <a:ext uri="{FF2B5EF4-FFF2-40B4-BE49-F238E27FC236}">
+                <a16:creationId xmlns:a16="http://schemas.microsoft.com/office/drawing/2014/main" id="{08C07B8C-0BDB-439F-A5CB-76BE9E7574BA}"/>
+              </a:ext>
+            </a:extLst>
+          </p:cNvPr>
+          <p:cNvSpPr>
+            <a:spLocks noGrp="1"/>
+          </p:cNvSpPr>
+          <p:nvPr>
+            <p:ph type="sldNum" sz="quarter" idx="12"/>
+          </p:nvPr>
+        </p:nvSpPr>
+        <p:spPr/>
+        <p:txBody>
+          <a:bodyPr/>
+          <a:lstStyle/>
+          <a:p>
+            <a:fld id="{5DD6F1BA-2510-46FC-9346-AB1F3CA1593B}" type="slidenum">
+              <a:rPr lang="it-IT" smtClean="0"/>
+              <a:t>29</a:t>
+            </a:fld>
+            <a:endParaRPr lang="it-IT"/>
+          </a:p>
+        </p:txBody>
+      </p:sp>
+      <p:sp>
+        <p:nvSpPr>
+          <p:cNvPr id="6" name="Segnaposto contenuto 5">
+            <a:extLst>
+              <a:ext uri="{FF2B5EF4-FFF2-40B4-BE49-F238E27FC236}">
+                <a16:creationId xmlns:a16="http://schemas.microsoft.com/office/drawing/2014/main" id="{5C4DF7A5-4A58-4E17-A82B-0CEB29A2C518}"/>
+              </a:ext>
+            </a:extLst>
+          </p:cNvPr>
+          <p:cNvSpPr>
+            <a:spLocks noGrp="1"/>
+          </p:cNvSpPr>
+          <p:nvPr>
+            <p:ph idx="13"/>
+          </p:nvPr>
+        </p:nvSpPr>
+        <p:spPr/>
+        <p:txBody>
+          <a:bodyPr/>
+          <a:lstStyle/>
+          <a:p>
+            <a:endParaRPr lang="en-US"/>
+          </a:p>
+        </p:txBody>
+      </p:sp>
+    </p:spTree>
+    <p:extLst>
+      <p:ext uri="{BB962C8B-B14F-4D97-AF65-F5344CB8AC3E}">
+        <p14:creationId xmlns:p14="http://schemas.microsoft.com/office/powerpoint/2010/main" val="4034451289"/>
+      </p:ext>
+    </p:extLst>
+  </p:cSld>
+  <p:clrMapOvr>
+    <a:masterClrMapping/>
+  </p:clrMapOvr>
+</p:sld>
+</file>
+
 <file path=ppt/slides/slide3.xml><?xml version="1.0" encoding="utf-8"?>
 <p:sld xmlns:a="http://schemas.openxmlformats.org/drawingml/2006/main" xmlns:r="http://schemas.openxmlformats.org/officeDocument/2006/relationships" xmlns:p="http://schemas.openxmlformats.org/presentationml/2006/main">
   <p:cSld>
@@ -11313,6 +11836,806 @@
     <p:extLst>
       <p:ext uri="{BB962C8B-B14F-4D97-AF65-F5344CB8AC3E}">
         <p14:creationId xmlns:p14="http://schemas.microsoft.com/office/powerpoint/2010/main" val="2909318568"/>
+      </p:ext>
+    </p:extLst>
+  </p:cSld>
+  <p:clrMapOvr>
+    <a:masterClrMapping/>
+  </p:clrMapOvr>
+</p:sld>
+</file>
+
+<file path=ppt/slides/slide30.xml><?xml version="1.0" encoding="utf-8"?>
+<p:sld xmlns:a="http://schemas.openxmlformats.org/drawingml/2006/main" xmlns:r="http://schemas.openxmlformats.org/officeDocument/2006/relationships" xmlns:p="http://schemas.openxmlformats.org/presentationml/2006/main">
+  <p:cSld>
+    <p:spTree>
+      <p:nvGrpSpPr>
+        <p:cNvPr id="1" name=""/>
+        <p:cNvGrpSpPr/>
+        <p:nvPr/>
+      </p:nvGrpSpPr>
+      <p:grpSpPr>
+        <a:xfrm>
+          <a:off x="0" y="0"/>
+          <a:ext cx="0" cy="0"/>
+          <a:chOff x="0" y="0"/>
+          <a:chExt cx="0" cy="0"/>
+        </a:xfrm>
+      </p:grpSpPr>
+      <p:sp>
+        <p:nvSpPr>
+          <p:cNvPr id="2" name="Titolo 1">
+            <a:extLst>
+              <a:ext uri="{FF2B5EF4-FFF2-40B4-BE49-F238E27FC236}">
+                <a16:creationId xmlns:a16="http://schemas.microsoft.com/office/drawing/2014/main" id="{A839600C-C00C-47AA-9B6A-CEA107C8AB5A}"/>
+              </a:ext>
+            </a:extLst>
+          </p:cNvPr>
+          <p:cNvSpPr>
+            <a:spLocks noGrp="1"/>
+          </p:cNvSpPr>
+          <p:nvPr>
+            <p:ph type="title"/>
+          </p:nvPr>
+        </p:nvSpPr>
+        <p:spPr>
+          <a:xfrm>
+            <a:off x="838200" y="365125"/>
+            <a:ext cx="10515600" cy="1325563"/>
+          </a:xfrm>
+        </p:spPr>
+        <p:txBody>
+          <a:bodyPr/>
+          <a:lstStyle/>
+          <a:p>
+            <a:r>
+              <a:rPr lang="it-IT" dirty="0"/>
+              <a:t>Data </a:t>
+            </a:r>
+            <a:r>
+              <a:rPr lang="it-IT" dirty="0" err="1"/>
+              <a:t>preprocessing</a:t>
+            </a:r>
+            <a:endParaRPr lang="en-US" dirty="0"/>
+          </a:p>
+        </p:txBody>
+      </p:sp>
+      <p:sp>
+        <p:nvSpPr>
+          <p:cNvPr id="3" name="Segnaposto contenuto 2">
+            <a:extLst>
+              <a:ext uri="{FF2B5EF4-FFF2-40B4-BE49-F238E27FC236}">
+                <a16:creationId xmlns:a16="http://schemas.microsoft.com/office/drawing/2014/main" id="{8766FEC4-12D0-4F8E-B584-63450100AC6C}"/>
+              </a:ext>
+            </a:extLst>
+          </p:cNvPr>
+          <p:cNvSpPr>
+            <a:spLocks noGrp="1"/>
+          </p:cNvSpPr>
+          <p:nvPr>
+            <p:ph idx="1"/>
+          </p:nvPr>
+        </p:nvSpPr>
+        <p:spPr>
+          <a:xfrm>
+            <a:off x="838200" y="1700499"/>
+            <a:ext cx="10515600" cy="4351338"/>
+          </a:xfrm>
+        </p:spPr>
+        <p:txBody>
+          <a:bodyPr/>
+          <a:lstStyle/>
+          <a:p>
+            <a:r>
+              <a:rPr lang="en-US" dirty="0"/>
+              <a:t>Which transformations can we apply?</a:t>
+            </a:r>
+          </a:p>
+          <a:p>
+            <a:pPr lvl="1"/>
+            <a:r>
+              <a:rPr lang="en-US" dirty="0">
+                <a:solidFill>
+                  <a:schemeClr val="accent1"/>
+                </a:solidFill>
+                <a:effectLst/>
+                <a:latin typeface="Arial" panose="020B0604020202020204" pitchFamily="34" charset="0"/>
+              </a:rPr>
+              <a:t>Encoding</a:t>
+            </a:r>
+            <a:r>
+              <a:rPr lang="en-US" dirty="0">
+                <a:effectLst/>
+                <a:latin typeface="Arial" panose="020B0604020202020204" pitchFamily="34" charset="0"/>
+              </a:rPr>
+              <a:t>: transforming categorical attributes into continuous ones</a:t>
+            </a:r>
+          </a:p>
+          <a:p>
+            <a:pPr lvl="1"/>
+            <a:r>
+              <a:rPr lang="en-US" dirty="0">
+                <a:solidFill>
+                  <a:schemeClr val="accent1"/>
+                </a:solidFill>
+                <a:effectLst/>
+                <a:latin typeface="Arial" panose="020B0604020202020204" pitchFamily="34" charset="0"/>
+              </a:rPr>
+              <a:t>Normalization</a:t>
+            </a:r>
+            <a:r>
+              <a:rPr lang="en-US" dirty="0">
+                <a:effectLst/>
+                <a:latin typeface="Arial" panose="020B0604020202020204" pitchFamily="34" charset="0"/>
+              </a:rPr>
+              <a:t>: normalizing continuous attributes such that their values fall in the same range</a:t>
+            </a:r>
+          </a:p>
+          <a:p>
+            <a:pPr lvl="1"/>
+            <a:r>
+              <a:rPr lang="en-US" dirty="0">
+                <a:solidFill>
+                  <a:schemeClr val="accent1"/>
+                </a:solidFill>
+                <a:effectLst/>
+                <a:latin typeface="Arial" panose="020B0604020202020204" pitchFamily="34" charset="0"/>
+              </a:rPr>
+              <a:t>Discretization</a:t>
+            </a:r>
+            <a:r>
+              <a:rPr lang="en-US" dirty="0">
+                <a:effectLst/>
+                <a:latin typeface="Arial" panose="020B0604020202020204" pitchFamily="34" charset="0"/>
+              </a:rPr>
+              <a:t>: transforming continuous attributes into categorical ones</a:t>
+            </a:r>
+          </a:p>
+          <a:p>
+            <a:pPr lvl="1"/>
+            <a:r>
+              <a:rPr lang="en-US" dirty="0">
+                <a:solidFill>
+                  <a:schemeClr val="accent1"/>
+                </a:solidFill>
+                <a:effectLst/>
+                <a:latin typeface="Arial" panose="020B0604020202020204" pitchFamily="34" charset="0"/>
+              </a:rPr>
+              <a:t>Imputation</a:t>
+            </a:r>
+            <a:r>
+              <a:rPr lang="en-US" dirty="0">
+                <a:effectLst/>
+                <a:latin typeface="Arial" panose="020B0604020202020204" pitchFamily="34" charset="0"/>
+              </a:rPr>
+              <a:t>: imputing missing values</a:t>
+            </a:r>
+          </a:p>
+          <a:p>
+            <a:pPr lvl="1"/>
+            <a:r>
+              <a:rPr lang="en-US" dirty="0">
+                <a:solidFill>
+                  <a:schemeClr val="accent1"/>
+                </a:solidFill>
+                <a:effectLst/>
+                <a:latin typeface="Arial" panose="020B0604020202020204" pitchFamily="34" charset="0"/>
+              </a:rPr>
+              <a:t>Rebalancing</a:t>
+            </a:r>
+            <a:r>
+              <a:rPr lang="en-US" dirty="0">
+                <a:effectLst/>
+                <a:latin typeface="Arial" panose="020B0604020202020204" pitchFamily="34" charset="0"/>
+              </a:rPr>
+              <a:t>: adjusting the class distribution of a dataset (i.e., the ratio between the different classes/categories represented)</a:t>
+            </a:r>
+          </a:p>
+          <a:p>
+            <a:pPr lvl="1"/>
+            <a:r>
+              <a:rPr lang="en-US" dirty="0">
+                <a:solidFill>
+                  <a:schemeClr val="accent1"/>
+                </a:solidFill>
+                <a:effectLst/>
+                <a:latin typeface="Arial" panose="020B0604020202020204" pitchFamily="34" charset="0"/>
+              </a:rPr>
+              <a:t>Feature</a:t>
+            </a:r>
+            <a:r>
+              <a:rPr lang="en-US" dirty="0">
+                <a:effectLst/>
+                <a:latin typeface="Arial" panose="020B0604020202020204" pitchFamily="34" charset="0"/>
+              </a:rPr>
+              <a:t> </a:t>
+            </a:r>
+            <a:r>
+              <a:rPr lang="en-US" dirty="0">
+                <a:solidFill>
+                  <a:schemeClr val="accent1"/>
+                </a:solidFill>
+                <a:effectLst/>
+                <a:latin typeface="Arial" panose="020B0604020202020204" pitchFamily="34" charset="0"/>
+              </a:rPr>
+              <a:t>Engineering</a:t>
+            </a:r>
+            <a:r>
+              <a:rPr lang="en-US" dirty="0">
+                <a:effectLst/>
+                <a:latin typeface="Arial" panose="020B0604020202020204" pitchFamily="34" charset="0"/>
+              </a:rPr>
+              <a:t>: defining the set of relevant attributes (variables, predictors) to be used in model construction</a:t>
+            </a:r>
+            <a:endParaRPr lang="en-US" dirty="0"/>
+          </a:p>
+          <a:p>
+            <a:r>
+              <a:rPr lang="en-US" dirty="0"/>
+              <a:t>Things are even more complex when applying sequences of transformations</a:t>
+            </a:r>
+          </a:p>
+          <a:p>
+            <a:pPr lvl="1"/>
+            <a:r>
+              <a:rPr lang="it-IT" dirty="0"/>
+              <a:t>E.g., </a:t>
+            </a:r>
+            <a:r>
+              <a:rPr lang="it-IT" dirty="0" err="1"/>
+              <a:t>normalization</a:t>
+            </a:r>
+            <a:r>
+              <a:rPr lang="it-IT" dirty="0"/>
+              <a:t> </a:t>
+            </a:r>
+            <a:r>
+              <a:rPr lang="it-IT" dirty="0" err="1"/>
+              <a:t>should</a:t>
+            </a:r>
+            <a:r>
+              <a:rPr lang="it-IT" dirty="0"/>
+              <a:t> be </a:t>
+            </a:r>
+            <a:r>
+              <a:rPr lang="it-IT" dirty="0" err="1"/>
+              <a:t>applied</a:t>
+            </a:r>
+            <a:r>
+              <a:rPr lang="it-IT" dirty="0"/>
+              <a:t> </a:t>
+            </a:r>
+            <a:r>
+              <a:rPr lang="it-IT" dirty="0" err="1"/>
+              <a:t>before</a:t>
+            </a:r>
+            <a:r>
+              <a:rPr lang="it-IT" dirty="0"/>
+              <a:t> </a:t>
+            </a:r>
+            <a:r>
+              <a:rPr lang="it-IT" dirty="0" err="1"/>
+              <a:t>rebalancing</a:t>
+            </a:r>
+            <a:r>
+              <a:rPr lang="it-IT" dirty="0"/>
+              <a:t> </a:t>
+            </a:r>
+            <a:r>
+              <a:rPr lang="it-IT" dirty="0" err="1"/>
+              <a:t>since</a:t>
+            </a:r>
+            <a:r>
+              <a:rPr lang="it-IT" dirty="0"/>
+              <a:t> </a:t>
+            </a:r>
+            <a:r>
+              <a:rPr lang="it-IT" dirty="0" err="1"/>
+              <a:t>rebalancing</a:t>
+            </a:r>
+            <a:r>
+              <a:rPr lang="it-IT" dirty="0"/>
+              <a:t> (e.g., by </a:t>
+            </a:r>
+            <a:r>
+              <a:rPr lang="it-IT" dirty="0" err="1"/>
+              <a:t>resampling</a:t>
+            </a:r>
+            <a:r>
+              <a:rPr lang="it-IT" dirty="0"/>
+              <a:t>) </a:t>
+            </a:r>
+            <a:r>
+              <a:rPr lang="it-IT" dirty="0" err="1"/>
+              <a:t>alters</a:t>
+            </a:r>
+            <a:r>
+              <a:rPr lang="it-IT" dirty="0"/>
+              <a:t> </a:t>
+            </a:r>
+            <a:r>
+              <a:rPr lang="it-IT" dirty="0" err="1"/>
+              <a:t>average</a:t>
+            </a:r>
+            <a:r>
+              <a:rPr lang="it-IT" dirty="0"/>
+              <a:t> and standard </a:t>
+            </a:r>
+            <a:r>
+              <a:rPr lang="it-IT" dirty="0" err="1"/>
+              <a:t>deviations</a:t>
+            </a:r>
+            <a:endParaRPr lang="it-IT" dirty="0"/>
+          </a:p>
+          <a:p>
+            <a:pPr lvl="1"/>
+            <a:r>
+              <a:rPr lang="it-IT" dirty="0"/>
+              <a:t>E.g., </a:t>
+            </a:r>
+            <a:r>
+              <a:rPr lang="it-IT" dirty="0" err="1"/>
+              <a:t>applying</a:t>
+            </a:r>
+            <a:r>
+              <a:rPr lang="it-IT" dirty="0"/>
+              <a:t> feature engineering </a:t>
+            </a:r>
+            <a:r>
+              <a:rPr lang="it-IT" dirty="0" err="1"/>
+              <a:t>before</a:t>
+            </a:r>
+            <a:r>
+              <a:rPr lang="it-IT" dirty="0"/>
+              <a:t>/after </a:t>
+            </a:r>
+            <a:r>
+              <a:rPr lang="it-IT" dirty="0" err="1"/>
+              <a:t>rebalancing</a:t>
+            </a:r>
+            <a:r>
+              <a:rPr lang="it-IT" dirty="0"/>
+              <a:t> </a:t>
+            </a:r>
+            <a:r>
+              <a:rPr lang="it-IT" dirty="0" err="1"/>
+              <a:t>produces</a:t>
+            </a:r>
+            <a:r>
+              <a:rPr lang="it-IT" dirty="0"/>
+              <a:t> </a:t>
+            </a:r>
+            <a:r>
+              <a:rPr lang="it-IT" dirty="0" err="1"/>
+              <a:t>different</a:t>
+            </a:r>
+            <a:r>
+              <a:rPr lang="it-IT" dirty="0"/>
+              <a:t> </a:t>
+            </a:r>
+            <a:r>
+              <a:rPr lang="it-IT" dirty="0" err="1"/>
+              <a:t>results</a:t>
+            </a:r>
+            <a:r>
+              <a:rPr lang="it-IT" dirty="0"/>
+              <a:t> </a:t>
+            </a:r>
+            <a:r>
+              <a:rPr lang="it-IT" dirty="0" err="1"/>
+              <a:t>which</a:t>
+            </a:r>
+            <a:r>
+              <a:rPr lang="it-IT" dirty="0"/>
+              <a:t> </a:t>
+            </a:r>
+            <a:r>
+              <a:rPr lang="it-IT" dirty="0" err="1"/>
+              <a:t>depends</a:t>
+            </a:r>
+            <a:r>
+              <a:rPr lang="it-IT" dirty="0"/>
+              <a:t> on the dataset and </a:t>
+            </a:r>
+            <a:r>
+              <a:rPr lang="it-IT" dirty="0" err="1"/>
+              <a:t>algorithm</a:t>
+            </a:r>
+            <a:endParaRPr lang="it-IT" dirty="0"/>
+          </a:p>
+        </p:txBody>
+      </p:sp>
+      <p:sp>
+        <p:nvSpPr>
+          <p:cNvPr id="4" name="Segnaposto piè di pagina 3">
+            <a:extLst>
+              <a:ext uri="{FF2B5EF4-FFF2-40B4-BE49-F238E27FC236}">
+                <a16:creationId xmlns:a16="http://schemas.microsoft.com/office/drawing/2014/main" id="{56427855-B746-4D9D-A3E7-6793C72C48DE}"/>
+              </a:ext>
+            </a:extLst>
+          </p:cNvPr>
+          <p:cNvSpPr>
+            <a:spLocks noGrp="1"/>
+          </p:cNvSpPr>
+          <p:nvPr>
+            <p:ph type="ftr" sz="quarter" idx="11"/>
+          </p:nvPr>
+        </p:nvSpPr>
+        <p:spPr>
+          <a:xfrm>
+            <a:off x="-1" y="6492875"/>
+            <a:ext cx="2837793" cy="365125"/>
+          </a:xfrm>
+        </p:spPr>
+        <p:txBody>
+          <a:bodyPr/>
+          <a:lstStyle/>
+          <a:p>
+            <a:r>
+              <a:rPr lang="it-IT"/>
+              <a:t>Matteo Francia – University of Bologna</a:t>
+            </a:r>
+            <a:endParaRPr lang="it-IT" dirty="0"/>
+          </a:p>
+        </p:txBody>
+      </p:sp>
+      <p:sp>
+        <p:nvSpPr>
+          <p:cNvPr id="5" name="Segnaposto numero diapositiva 4">
+            <a:extLst>
+              <a:ext uri="{FF2B5EF4-FFF2-40B4-BE49-F238E27FC236}">
+                <a16:creationId xmlns:a16="http://schemas.microsoft.com/office/drawing/2014/main" id="{4CC3B221-7D4C-4259-BCF8-4AD0F577C20E}"/>
+              </a:ext>
+            </a:extLst>
+          </p:cNvPr>
+          <p:cNvSpPr>
+            <a:spLocks noGrp="1"/>
+          </p:cNvSpPr>
+          <p:nvPr>
+            <p:ph type="sldNum" sz="quarter" idx="12"/>
+          </p:nvPr>
+        </p:nvSpPr>
+        <p:spPr>
+          <a:xfrm>
+            <a:off x="9448800" y="6492874"/>
+            <a:ext cx="2743200" cy="365125"/>
+          </a:xfrm>
+        </p:spPr>
+        <p:txBody>
+          <a:bodyPr/>
+          <a:lstStyle/>
+          <a:p>
+            <a:fld id="{5DD6F1BA-2510-46FC-9346-AB1F3CA1593B}" type="slidenum">
+              <a:rPr lang="it-IT" smtClean="0"/>
+              <a:pPr/>
+              <a:t>30</a:t>
+            </a:fld>
+            <a:endParaRPr lang="it-IT"/>
+          </a:p>
+        </p:txBody>
+      </p:sp>
+      <p:sp>
+        <p:nvSpPr>
+          <p:cNvPr id="11" name="Segnaposto contenuto 10">
+            <a:extLst>
+              <a:ext uri="{FF2B5EF4-FFF2-40B4-BE49-F238E27FC236}">
+                <a16:creationId xmlns:a16="http://schemas.microsoft.com/office/drawing/2014/main" id="{25823A0A-27BA-4A9D-AE0C-3B5E41C4B04D}"/>
+              </a:ext>
+            </a:extLst>
+          </p:cNvPr>
+          <p:cNvSpPr>
+            <a:spLocks noGrp="1"/>
+          </p:cNvSpPr>
+          <p:nvPr>
+            <p:ph idx="13"/>
+          </p:nvPr>
+        </p:nvSpPr>
+        <p:spPr/>
+        <p:txBody>
+          <a:bodyPr/>
+          <a:lstStyle/>
+          <a:p>
+            <a:endParaRPr lang="en-US"/>
+          </a:p>
+        </p:txBody>
+      </p:sp>
+    </p:spTree>
+    <p:extLst>
+      <p:ext uri="{BB962C8B-B14F-4D97-AF65-F5344CB8AC3E}">
+        <p14:creationId xmlns:p14="http://schemas.microsoft.com/office/powerpoint/2010/main" val="2039114162"/>
+      </p:ext>
+    </p:extLst>
+  </p:cSld>
+  <p:clrMapOvr>
+    <a:masterClrMapping/>
+  </p:clrMapOvr>
+</p:sld>
+</file>
+
+<file path=ppt/slides/slide31.xml><?xml version="1.0" encoding="utf-8"?>
+<p:sld xmlns:a="http://schemas.openxmlformats.org/drawingml/2006/main" xmlns:r="http://schemas.openxmlformats.org/officeDocument/2006/relationships" xmlns:p="http://schemas.openxmlformats.org/presentationml/2006/main">
+  <p:cSld>
+    <p:spTree>
+      <p:nvGrpSpPr>
+        <p:cNvPr id="1" name=""/>
+        <p:cNvGrpSpPr/>
+        <p:nvPr/>
+      </p:nvGrpSpPr>
+      <p:grpSpPr>
+        <a:xfrm>
+          <a:off x="0" y="0"/>
+          <a:ext cx="0" cy="0"/>
+          <a:chOff x="0" y="0"/>
+          <a:chExt cx="0" cy="0"/>
+        </a:xfrm>
+      </p:grpSpPr>
+      <p:sp>
+        <p:nvSpPr>
+          <p:cNvPr id="2" name="Titolo 1">
+            <a:extLst>
+              <a:ext uri="{FF2B5EF4-FFF2-40B4-BE49-F238E27FC236}">
+                <a16:creationId xmlns:a16="http://schemas.microsoft.com/office/drawing/2014/main" id="{253CDFF1-EEB5-43C2-B217-8ADB89C6C06A}"/>
+              </a:ext>
+            </a:extLst>
+          </p:cNvPr>
+          <p:cNvSpPr>
+            <a:spLocks noGrp="1"/>
+          </p:cNvSpPr>
+          <p:nvPr>
+            <p:ph type="title"/>
+          </p:nvPr>
+        </p:nvSpPr>
+        <p:spPr>
+          <a:xfrm>
+            <a:off x="838200" y="365125"/>
+            <a:ext cx="10515600" cy="1325563"/>
+          </a:xfrm>
+        </p:spPr>
+        <p:txBody>
+          <a:bodyPr/>
+          <a:lstStyle/>
+          <a:p>
+            <a:r>
+              <a:rPr lang="it-IT" dirty="0"/>
+              <a:t>Data </a:t>
+            </a:r>
+            <a:r>
+              <a:rPr lang="it-IT" dirty="0" err="1"/>
+              <a:t>preprocessing</a:t>
+            </a:r>
+            <a:endParaRPr lang="en-US" dirty="0"/>
+          </a:p>
+        </p:txBody>
+      </p:sp>
+      <p:sp>
+        <p:nvSpPr>
+          <p:cNvPr id="3" name="Segnaposto contenuto 2">
+            <a:extLst>
+              <a:ext uri="{FF2B5EF4-FFF2-40B4-BE49-F238E27FC236}">
+                <a16:creationId xmlns:a16="http://schemas.microsoft.com/office/drawing/2014/main" id="{5B7843FD-0DD5-4691-9ACA-BADC11EDFF33}"/>
+              </a:ext>
+            </a:extLst>
+          </p:cNvPr>
+          <p:cNvSpPr>
+            <a:spLocks noGrp="1"/>
+          </p:cNvSpPr>
+          <p:nvPr>
+            <p:ph idx="1"/>
+          </p:nvPr>
+        </p:nvSpPr>
+        <p:spPr>
+          <a:xfrm>
+            <a:off x="838200" y="1700499"/>
+            <a:ext cx="10515600" cy="4351338"/>
+          </a:xfrm>
+        </p:spPr>
+        <p:txBody>
+          <a:bodyPr/>
+          <a:lstStyle/>
+          <a:p>
+            <a:r>
+              <a:rPr lang="it-IT" dirty="0"/>
+              <a:t>More an art </a:t>
+            </a:r>
+            <a:r>
+              <a:rPr lang="it-IT" dirty="0" err="1"/>
+              <a:t>than</a:t>
+            </a:r>
+            <a:r>
+              <a:rPr lang="it-IT" dirty="0"/>
+              <a:t> a science</a:t>
+            </a:r>
+          </a:p>
+          <a:p>
+            <a:endParaRPr lang="it-IT" dirty="0"/>
+          </a:p>
+          <a:p>
+            <a:r>
+              <a:rPr lang="it-IT" dirty="0"/>
+              <a:t>First of </a:t>
+            </a:r>
+            <a:r>
+              <a:rPr lang="it-IT" dirty="0" err="1"/>
+              <a:t>all</a:t>
+            </a:r>
+            <a:r>
+              <a:rPr lang="it-IT" dirty="0"/>
+              <a:t>, take a look </a:t>
+            </a:r>
+            <a:r>
+              <a:rPr lang="it-IT" dirty="0" err="1"/>
+              <a:t>at</a:t>
+            </a:r>
+            <a:r>
+              <a:rPr lang="it-IT" dirty="0"/>
+              <a:t> the data</a:t>
+            </a:r>
+          </a:p>
+          <a:p>
+            <a:pPr lvl="1"/>
+            <a:r>
+              <a:rPr lang="en-US" dirty="0"/>
+              <a:t>Data are usually spread across multiple (even inconsistent) documents/files </a:t>
+            </a:r>
+          </a:p>
+          <a:p>
+            <a:pPr lvl="2"/>
+            <a:r>
+              <a:rPr lang="en-US" dirty="0"/>
+              <a:t>You need to merge them</a:t>
+            </a:r>
+          </a:p>
+          <a:p>
+            <a:pPr lvl="1"/>
+            <a:r>
+              <a:rPr lang="en-US" dirty="0"/>
+              <a:t>Here, things are simple: you have already downloaded a single *.csv file with all the data</a:t>
+            </a:r>
+          </a:p>
+          <a:p>
+            <a:pPr lvl="1"/>
+            <a:r>
+              <a:rPr lang="en-US" dirty="0"/>
+              <a:t>Visualization helps the process of understanding the data</a:t>
+            </a:r>
+          </a:p>
+          <a:p>
+            <a:endParaRPr lang="en-US" dirty="0"/>
+          </a:p>
+          <a:p>
+            <a:r>
+              <a:rPr lang="en-US" dirty="0"/>
+              <a:t>Example of questions:</a:t>
+            </a:r>
+          </a:p>
+          <a:p>
+            <a:pPr lvl="1"/>
+            <a:r>
+              <a:rPr lang="en-US" dirty="0"/>
+              <a:t>Which attributes (i.e., columns) are contained in the dataset?</a:t>
+            </a:r>
+          </a:p>
+          <a:p>
+            <a:pPr lvl="1"/>
+            <a:r>
+              <a:rPr lang="en-US" dirty="0"/>
+              <a:t>Which is the distribution of each attribute?</a:t>
+            </a:r>
+          </a:p>
+          <a:p>
+            <a:pPr lvl="1"/>
+            <a:r>
+              <a:rPr lang="en-US" dirty="0"/>
+              <a:t>Which is the range of each attribute?</a:t>
+            </a:r>
+          </a:p>
+          <a:p>
+            <a:pPr lvl="1"/>
+            <a:r>
+              <a:rPr lang="en-US" dirty="0"/>
+              <a:t>How do we treat missing data?</a:t>
+            </a:r>
+          </a:p>
+        </p:txBody>
+      </p:sp>
+      <p:sp>
+        <p:nvSpPr>
+          <p:cNvPr id="4" name="Segnaposto piè di pagina 3">
+            <a:extLst>
+              <a:ext uri="{FF2B5EF4-FFF2-40B4-BE49-F238E27FC236}">
+                <a16:creationId xmlns:a16="http://schemas.microsoft.com/office/drawing/2014/main" id="{84F1DD40-3B04-4401-8F63-69FB380D10E3}"/>
+              </a:ext>
+            </a:extLst>
+          </p:cNvPr>
+          <p:cNvSpPr>
+            <a:spLocks noGrp="1"/>
+          </p:cNvSpPr>
+          <p:nvPr>
+            <p:ph type="ftr" sz="quarter" idx="11"/>
+          </p:nvPr>
+        </p:nvSpPr>
+        <p:spPr>
+          <a:xfrm>
+            <a:off x="-1" y="6492875"/>
+            <a:ext cx="2837793" cy="365125"/>
+          </a:xfrm>
+        </p:spPr>
+        <p:txBody>
+          <a:bodyPr/>
+          <a:lstStyle/>
+          <a:p>
+            <a:r>
+              <a:rPr lang="it-IT"/>
+              <a:t>Matteo Francia – University of Bologna</a:t>
+            </a:r>
+            <a:endParaRPr lang="it-IT" dirty="0"/>
+          </a:p>
+        </p:txBody>
+      </p:sp>
+      <p:sp>
+        <p:nvSpPr>
+          <p:cNvPr id="5" name="Segnaposto numero diapositiva 4">
+            <a:extLst>
+              <a:ext uri="{FF2B5EF4-FFF2-40B4-BE49-F238E27FC236}">
+                <a16:creationId xmlns:a16="http://schemas.microsoft.com/office/drawing/2014/main" id="{716BA1F0-BB1C-4182-AC24-0C3218793CFD}"/>
+              </a:ext>
+            </a:extLst>
+          </p:cNvPr>
+          <p:cNvSpPr>
+            <a:spLocks noGrp="1"/>
+          </p:cNvSpPr>
+          <p:nvPr>
+            <p:ph type="sldNum" sz="quarter" idx="12"/>
+          </p:nvPr>
+        </p:nvSpPr>
+        <p:spPr>
+          <a:xfrm>
+            <a:off x="9448800" y="6492874"/>
+            <a:ext cx="2743200" cy="365125"/>
+          </a:xfrm>
+        </p:spPr>
+        <p:txBody>
+          <a:bodyPr/>
+          <a:lstStyle/>
+          <a:p>
+            <a:fld id="{5DD6F1BA-2510-46FC-9346-AB1F3CA1593B}" type="slidenum">
+              <a:rPr lang="it-IT" smtClean="0"/>
+              <a:pPr/>
+              <a:t>31</a:t>
+            </a:fld>
+            <a:endParaRPr lang="it-IT"/>
+          </a:p>
+        </p:txBody>
+      </p:sp>
+      <p:sp>
+        <p:nvSpPr>
+          <p:cNvPr id="11" name="Segnaposto contenuto 10">
+            <a:extLst>
+              <a:ext uri="{FF2B5EF4-FFF2-40B4-BE49-F238E27FC236}">
+                <a16:creationId xmlns:a16="http://schemas.microsoft.com/office/drawing/2014/main" id="{89C549C9-DF46-4670-A464-221DF587B478}"/>
+              </a:ext>
+            </a:extLst>
+          </p:cNvPr>
+          <p:cNvSpPr>
+            <a:spLocks noGrp="1"/>
+          </p:cNvSpPr>
+          <p:nvPr>
+            <p:ph idx="13"/>
+          </p:nvPr>
+        </p:nvSpPr>
+        <p:spPr/>
+        <p:txBody>
+          <a:bodyPr/>
+          <a:lstStyle/>
+          <a:p>
+            <a:endParaRPr lang="en-US"/>
+          </a:p>
+        </p:txBody>
+      </p:sp>
+    </p:spTree>
+    <p:extLst>
+      <p:ext uri="{BB962C8B-B14F-4D97-AF65-F5344CB8AC3E}">
+        <p14:creationId xmlns:p14="http://schemas.microsoft.com/office/powerpoint/2010/main" val="613733716"/>
       </p:ext>
     </p:extLst>
   </p:cSld>

</xml_diff>